<commit_message>
changed cache  absolute paths to env vars
</commit_message>
<xml_diff>
--- a/nextflow_overview.pptx
+++ b/nextflow_overview.pptx
@@ -110,6 +110,11 @@
       </a:defRPr>
     </a:lvl9pPr>
   </p:defaultTextStyle>
+  <p:extLst>
+    <p:ext uri="{EFAFB233-063F-42B5-8137-9DF3F51BA10A}">
+      <p15:sldGuideLst xmlns:p15="http://schemas.microsoft.com/office/powerpoint/2012/main"/>
+    </p:ext>
+  </p:extLst>
 </p:presentation>
 </file>
 
@@ -260,7 +265,7 @@
           <a:p>
             <a:fld id="{EE92DC47-638F-3C47-878E-1E2B54A6F292}" type="datetimeFigureOut">
               <a:rPr lang="en-US" smtClean="0"/>
-              <a:t>6/9/22</a:t>
+              <a:t>6/14/22</a:t>
             </a:fld>
             <a:endParaRPr lang="en-US"/>
           </a:p>
@@ -458,7 +463,7 @@
           <a:p>
             <a:fld id="{EE92DC47-638F-3C47-878E-1E2B54A6F292}" type="datetimeFigureOut">
               <a:rPr lang="en-US" smtClean="0"/>
-              <a:t>6/9/22</a:t>
+              <a:t>6/14/22</a:t>
             </a:fld>
             <a:endParaRPr lang="en-US"/>
           </a:p>
@@ -666,7 +671,7 @@
           <a:p>
             <a:fld id="{EE92DC47-638F-3C47-878E-1E2B54A6F292}" type="datetimeFigureOut">
               <a:rPr lang="en-US" smtClean="0"/>
-              <a:t>6/9/22</a:t>
+              <a:t>6/14/22</a:t>
             </a:fld>
             <a:endParaRPr lang="en-US"/>
           </a:p>
@@ -864,7 +869,7 @@
           <a:p>
             <a:fld id="{EE92DC47-638F-3C47-878E-1E2B54A6F292}" type="datetimeFigureOut">
               <a:rPr lang="en-US" smtClean="0"/>
-              <a:t>6/9/22</a:t>
+              <a:t>6/14/22</a:t>
             </a:fld>
             <a:endParaRPr lang="en-US"/>
           </a:p>
@@ -1139,7 +1144,7 @@
           <a:p>
             <a:fld id="{EE92DC47-638F-3C47-878E-1E2B54A6F292}" type="datetimeFigureOut">
               <a:rPr lang="en-US" smtClean="0"/>
-              <a:t>6/9/22</a:t>
+              <a:t>6/14/22</a:t>
             </a:fld>
             <a:endParaRPr lang="en-US"/>
           </a:p>
@@ -1404,7 +1409,7 @@
           <a:p>
             <a:fld id="{EE92DC47-638F-3C47-878E-1E2B54A6F292}" type="datetimeFigureOut">
               <a:rPr lang="en-US" smtClean="0"/>
-              <a:t>6/9/22</a:t>
+              <a:t>6/14/22</a:t>
             </a:fld>
             <a:endParaRPr lang="en-US"/>
           </a:p>
@@ -1816,7 +1821,7 @@
           <a:p>
             <a:fld id="{EE92DC47-638F-3C47-878E-1E2B54A6F292}" type="datetimeFigureOut">
               <a:rPr lang="en-US" smtClean="0"/>
-              <a:t>6/9/22</a:t>
+              <a:t>6/14/22</a:t>
             </a:fld>
             <a:endParaRPr lang="en-US"/>
           </a:p>
@@ -1957,7 +1962,7 @@
           <a:p>
             <a:fld id="{EE92DC47-638F-3C47-878E-1E2B54A6F292}" type="datetimeFigureOut">
               <a:rPr lang="en-US" smtClean="0"/>
-              <a:t>6/9/22</a:t>
+              <a:t>6/14/22</a:t>
             </a:fld>
             <a:endParaRPr lang="en-US"/>
           </a:p>
@@ -2070,7 +2075,7 @@
           <a:p>
             <a:fld id="{EE92DC47-638F-3C47-878E-1E2B54A6F292}" type="datetimeFigureOut">
               <a:rPr lang="en-US" smtClean="0"/>
-              <a:t>6/9/22</a:t>
+              <a:t>6/14/22</a:t>
             </a:fld>
             <a:endParaRPr lang="en-US"/>
           </a:p>
@@ -2381,7 +2386,7 @@
           <a:p>
             <a:fld id="{EE92DC47-638F-3C47-878E-1E2B54A6F292}" type="datetimeFigureOut">
               <a:rPr lang="en-US" smtClean="0"/>
-              <a:t>6/9/22</a:t>
+              <a:t>6/14/22</a:t>
             </a:fld>
             <a:endParaRPr lang="en-US"/>
           </a:p>
@@ -2669,7 +2674,7 @@
           <a:p>
             <a:fld id="{EE92DC47-638F-3C47-878E-1E2B54A6F292}" type="datetimeFigureOut">
               <a:rPr lang="en-US" smtClean="0"/>
-              <a:t>6/9/22</a:t>
+              <a:t>6/14/22</a:t>
             </a:fld>
             <a:endParaRPr lang="en-US"/>
           </a:p>
@@ -2910,7 +2915,7 @@
           <a:p>
             <a:fld id="{EE92DC47-638F-3C47-878E-1E2B54A6F292}" type="datetimeFigureOut">
               <a:rPr lang="en-US" smtClean="0"/>
-              <a:t>6/9/22</a:t>
+              <a:t>6/14/22</a:t>
             </a:fld>
             <a:endParaRPr lang="en-US"/>
           </a:p>
@@ -3389,7 +3394,7 @@
           <a:p>
             <a:r>
               <a:rPr lang="en-US" dirty="0"/>
-              <a:t>6/9/2022</a:t>
+              <a:t>6/14/2022</a:t>
             </a:r>
           </a:p>
         </p:txBody>
@@ -3514,6 +3519,83 @@
           </a:prstGeom>
         </p:spPr>
       </p:pic>
+      <p:sp>
+        <p:nvSpPr>
+          <p:cNvPr id="3" name="TextBox 2">
+            <a:extLst>
+              <a:ext uri="{FF2B5EF4-FFF2-40B4-BE49-F238E27FC236}">
+                <a16:creationId xmlns:a16="http://schemas.microsoft.com/office/drawing/2014/main" id="{7F920C5A-DC14-59A0-4F57-66622C46DF69}"/>
+              </a:ext>
+            </a:extLst>
+          </p:cNvPr>
+          <p:cNvSpPr txBox="1"/>
+          <p:nvPr/>
+        </p:nvSpPr>
+        <p:spPr>
+          <a:xfrm>
+            <a:off x="611352" y="4696691"/>
+            <a:ext cx="5604164" cy="923330"/>
+          </a:xfrm>
+          <a:prstGeom prst="rect">
+            <a:avLst/>
+          </a:prstGeom>
+          <a:noFill/>
+        </p:spPr>
+        <p:txBody>
+          <a:bodyPr wrap="square" rtlCol="0">
+            <a:spAutoFit/>
+          </a:bodyPr>
+          <a:lstStyle/>
+          <a:p>
+            <a:pPr marL="285750" indent="-285750">
+              <a:buFont typeface="Arial" panose="020B0604020202020204" pitchFamily="34" charset="0"/>
+              <a:buChar char="•"/>
+            </a:pPr>
+            <a:r>
+              <a:rPr lang="en-US" dirty="0">
+                <a:hlinkClick r:id="rId4"/>
+              </a:rPr>
+              <a:t>https://nf-co.re/join</a:t>
+            </a:r>
+            <a:r>
+              <a:rPr lang="en-US" dirty="0"/>
+              <a:t> </a:t>
+            </a:r>
+          </a:p>
+          <a:p>
+            <a:pPr marL="285750" indent="-285750">
+              <a:buFont typeface="Arial" panose="020B0604020202020204" pitchFamily="34" charset="0"/>
+              <a:buChar char="•"/>
+            </a:pPr>
+            <a:r>
+              <a:rPr lang="en-US" dirty="0">
+                <a:hlinkClick r:id="rId5"/>
+              </a:rPr>
+              <a:t>https://nf-co.re/usage/introduction</a:t>
+            </a:r>
+            <a:r>
+              <a:rPr lang="en-US" dirty="0"/>
+              <a:t> </a:t>
+            </a:r>
+          </a:p>
+          <a:p>
+            <a:pPr marL="285750" indent="-285750">
+              <a:buFont typeface="Arial" panose="020B0604020202020204" pitchFamily="34" charset="0"/>
+              <a:buChar char="•"/>
+            </a:pPr>
+            <a:r>
+              <a:rPr lang="en-US" dirty="0">
+                <a:hlinkClick r:id="rId6"/>
+              </a:rPr>
+              <a:t>https://www.nextflow.io/docs/latest/dsl2.html</a:t>
+            </a:r>
+            <a:r>
+              <a:rPr lang="en-US" dirty="0"/>
+              <a:t> </a:t>
+            </a:r>
+          </a:p>
+        </p:txBody>
+      </p:sp>
     </p:spTree>
     <p:extLst>
       <p:ext uri="{BB962C8B-B14F-4D97-AF65-F5344CB8AC3E}">
@@ -3606,6 +3688,60 @@
           </a:xfrm>
         </p:spPr>
       </p:pic>
+      <p:sp>
+        <p:nvSpPr>
+          <p:cNvPr id="3" name="TextBox 2">
+            <a:extLst>
+              <a:ext uri="{FF2B5EF4-FFF2-40B4-BE49-F238E27FC236}">
+                <a16:creationId xmlns:a16="http://schemas.microsoft.com/office/drawing/2014/main" id="{7A8DD796-C90B-83CE-637D-7A500DDDD824}"/>
+              </a:ext>
+            </a:extLst>
+          </p:cNvPr>
+          <p:cNvSpPr txBox="1"/>
+          <p:nvPr/>
+        </p:nvSpPr>
+        <p:spPr>
+          <a:xfrm>
+            <a:off x="457200" y="2230582"/>
+            <a:ext cx="2272145" cy="1200329"/>
+          </a:xfrm>
+          <a:prstGeom prst="rect">
+            <a:avLst/>
+          </a:prstGeom>
+          <a:noFill/>
+        </p:spPr>
+        <p:txBody>
+          <a:bodyPr wrap="square" rtlCol="0">
+            <a:spAutoFit/>
+          </a:bodyPr>
+          <a:lstStyle/>
+          <a:p>
+            <a:pPr marL="285750" indent="-285750">
+              <a:buFont typeface="Arial" panose="020B0604020202020204" pitchFamily="34" charset="0"/>
+              <a:buChar char="•"/>
+            </a:pPr>
+            <a:r>
+              <a:rPr lang="en-US" dirty="0"/>
+              <a:t>Modular workflows </a:t>
+            </a:r>
+          </a:p>
+          <a:p>
+            <a:pPr marL="285750" indent="-285750">
+              <a:buFont typeface="Arial" panose="020B0604020202020204" pitchFamily="34" charset="0"/>
+              <a:buChar char="•"/>
+            </a:pPr>
+            <a:r>
+              <a:rPr lang="en-US" dirty="0"/>
+              <a:t>Can include </a:t>
+            </a:r>
+            <a:r>
+              <a:rPr lang="en-US" dirty="0" err="1"/>
+              <a:t>subworkflows</a:t>
+            </a:r>
+            <a:endParaRPr lang="en-US" dirty="0"/>
+          </a:p>
+        </p:txBody>
+      </p:sp>
     </p:spTree>
     <p:extLst>
       <p:ext uri="{BB962C8B-B14F-4D97-AF65-F5344CB8AC3E}">
@@ -3793,8 +3929,8 @@
         </p:blipFill>
         <p:spPr>
           <a:xfrm>
-            <a:off x="5635492" y="2450172"/>
-            <a:ext cx="6095221" cy="4133465"/>
+            <a:off x="5292436" y="2450172"/>
+            <a:ext cx="6438277" cy="4366108"/>
           </a:xfrm>
           <a:prstGeom prst="rect">
             <a:avLst/>

</xml_diff>